<commit_message>
removed the crossed out items
</commit_message>
<xml_diff>
--- a/Week 4/task02.1.pptx
+++ b/Week 4/task02.1.pptx
@@ -288,7 +288,8 @@
           <a:p>
             <a:fld id="{B656990D-21FA-4A3E-AE81-1FE9C4C08850}" type="datetimeFigureOut">
               <a:rPr lang="en-US" smtClean="0"/>
-              <a:t>10/30/2016</a:t>
+              <a:pPr/>
+              <a:t>11/1/2016</a:t>
             </a:fld>
             <a:endParaRPr lang="en-GB"/>
           </a:p>
@@ -330,6 +331,7 @@
           <a:p>
             <a:fld id="{FFB1C5F7-7D52-4F8D-A799-8E91F6DCDDE9}" type="slidenum">
               <a:rPr lang="en-GB" smtClean="0"/>
+              <a:pPr/>
               <a:t>‹#›</a:t>
             </a:fld>
             <a:endParaRPr lang="en-GB"/>
@@ -453,7 +455,8 @@
           <a:p>
             <a:fld id="{B656990D-21FA-4A3E-AE81-1FE9C4C08850}" type="datetimeFigureOut">
               <a:rPr lang="en-US" smtClean="0"/>
-              <a:t>10/30/2016</a:t>
+              <a:pPr/>
+              <a:t>11/1/2016</a:t>
             </a:fld>
             <a:endParaRPr lang="en-GB"/>
           </a:p>
@@ -495,6 +498,7 @@
           <a:p>
             <a:fld id="{FFB1C5F7-7D52-4F8D-A799-8E91F6DCDDE9}" type="slidenum">
               <a:rPr lang="en-GB" smtClean="0"/>
+              <a:pPr/>
               <a:t>‹#›</a:t>
             </a:fld>
             <a:endParaRPr lang="en-GB"/>
@@ -628,7 +632,8 @@
           <a:p>
             <a:fld id="{B656990D-21FA-4A3E-AE81-1FE9C4C08850}" type="datetimeFigureOut">
               <a:rPr lang="en-US" smtClean="0"/>
-              <a:t>10/30/2016</a:t>
+              <a:pPr/>
+              <a:t>11/1/2016</a:t>
             </a:fld>
             <a:endParaRPr lang="en-GB"/>
           </a:p>
@@ -670,6 +675,7 @@
           <a:p>
             <a:fld id="{FFB1C5F7-7D52-4F8D-A799-8E91F6DCDDE9}" type="slidenum">
               <a:rPr lang="en-GB" smtClean="0"/>
+              <a:pPr/>
               <a:t>‹#›</a:t>
             </a:fld>
             <a:endParaRPr lang="en-GB"/>
@@ -793,7 +799,8 @@
           <a:p>
             <a:fld id="{B656990D-21FA-4A3E-AE81-1FE9C4C08850}" type="datetimeFigureOut">
               <a:rPr lang="en-US" smtClean="0"/>
-              <a:t>10/30/2016</a:t>
+              <a:pPr/>
+              <a:t>11/1/2016</a:t>
             </a:fld>
             <a:endParaRPr lang="en-GB"/>
           </a:p>
@@ -835,6 +842,7 @@
           <a:p>
             <a:fld id="{FFB1C5F7-7D52-4F8D-A799-8E91F6DCDDE9}" type="slidenum">
               <a:rPr lang="en-GB" smtClean="0"/>
+              <a:pPr/>
               <a:t>‹#›</a:t>
             </a:fld>
             <a:endParaRPr lang="en-GB"/>
@@ -1034,7 +1042,8 @@
           <a:p>
             <a:fld id="{B656990D-21FA-4A3E-AE81-1FE9C4C08850}" type="datetimeFigureOut">
               <a:rPr lang="en-US" smtClean="0"/>
-              <a:t>10/30/2016</a:t>
+              <a:pPr/>
+              <a:t>11/1/2016</a:t>
             </a:fld>
             <a:endParaRPr lang="en-GB"/>
           </a:p>
@@ -1076,6 +1085,7 @@
           <a:p>
             <a:fld id="{FFB1C5F7-7D52-4F8D-A799-8E91F6DCDDE9}" type="slidenum">
               <a:rPr lang="en-GB" smtClean="0"/>
+              <a:pPr/>
               <a:t>‹#›</a:t>
             </a:fld>
             <a:endParaRPr lang="en-GB"/>
@@ -1317,7 +1327,8 @@
           <a:p>
             <a:fld id="{B656990D-21FA-4A3E-AE81-1FE9C4C08850}" type="datetimeFigureOut">
               <a:rPr lang="en-US" smtClean="0"/>
-              <a:t>10/30/2016</a:t>
+              <a:pPr/>
+              <a:t>11/1/2016</a:t>
             </a:fld>
             <a:endParaRPr lang="en-GB"/>
           </a:p>
@@ -1359,6 +1370,7 @@
           <a:p>
             <a:fld id="{FFB1C5F7-7D52-4F8D-A799-8E91F6DCDDE9}" type="slidenum">
               <a:rPr lang="en-GB" smtClean="0"/>
+              <a:pPr/>
               <a:t>‹#›</a:t>
             </a:fld>
             <a:endParaRPr lang="en-GB"/>
@@ -1734,7 +1746,8 @@
           <a:p>
             <a:fld id="{B656990D-21FA-4A3E-AE81-1FE9C4C08850}" type="datetimeFigureOut">
               <a:rPr lang="en-US" smtClean="0"/>
-              <a:t>10/30/2016</a:t>
+              <a:pPr/>
+              <a:t>11/1/2016</a:t>
             </a:fld>
             <a:endParaRPr lang="en-GB"/>
           </a:p>
@@ -1776,6 +1789,7 @@
           <a:p>
             <a:fld id="{FFB1C5F7-7D52-4F8D-A799-8E91F6DCDDE9}" type="slidenum">
               <a:rPr lang="en-GB" smtClean="0"/>
+              <a:pPr/>
               <a:t>‹#›</a:t>
             </a:fld>
             <a:endParaRPr lang="en-GB"/>
@@ -1847,7 +1861,8 @@
           <a:p>
             <a:fld id="{B656990D-21FA-4A3E-AE81-1FE9C4C08850}" type="datetimeFigureOut">
               <a:rPr lang="en-US" smtClean="0"/>
-              <a:t>10/30/2016</a:t>
+              <a:pPr/>
+              <a:t>11/1/2016</a:t>
             </a:fld>
             <a:endParaRPr lang="en-GB"/>
           </a:p>
@@ -1889,6 +1904,7 @@
           <a:p>
             <a:fld id="{FFB1C5F7-7D52-4F8D-A799-8E91F6DCDDE9}" type="slidenum">
               <a:rPr lang="en-GB" smtClean="0"/>
+              <a:pPr/>
               <a:t>‹#›</a:t>
             </a:fld>
             <a:endParaRPr lang="en-GB"/>
@@ -1937,7 +1953,8 @@
           <a:p>
             <a:fld id="{B656990D-21FA-4A3E-AE81-1FE9C4C08850}" type="datetimeFigureOut">
               <a:rPr lang="en-US" smtClean="0"/>
-              <a:t>10/30/2016</a:t>
+              <a:pPr/>
+              <a:t>11/1/2016</a:t>
             </a:fld>
             <a:endParaRPr lang="en-GB"/>
           </a:p>
@@ -1979,6 +1996,7 @@
           <a:p>
             <a:fld id="{FFB1C5F7-7D52-4F8D-A799-8E91F6DCDDE9}" type="slidenum">
               <a:rPr lang="en-GB" smtClean="0"/>
+              <a:pPr/>
               <a:t>‹#›</a:t>
             </a:fld>
             <a:endParaRPr lang="en-GB"/>
@@ -2209,7 +2227,8 @@
           <a:p>
             <a:fld id="{B656990D-21FA-4A3E-AE81-1FE9C4C08850}" type="datetimeFigureOut">
               <a:rPr lang="en-US" smtClean="0"/>
-              <a:t>10/30/2016</a:t>
+              <a:pPr/>
+              <a:t>11/1/2016</a:t>
             </a:fld>
             <a:endParaRPr lang="en-GB"/>
           </a:p>
@@ -2251,6 +2270,7 @@
           <a:p>
             <a:fld id="{FFB1C5F7-7D52-4F8D-A799-8E91F6DCDDE9}" type="slidenum">
               <a:rPr lang="en-GB" smtClean="0"/>
+              <a:pPr/>
               <a:t>‹#›</a:t>
             </a:fld>
             <a:endParaRPr lang="en-GB"/>
@@ -2457,7 +2477,8 @@
           <a:p>
             <a:fld id="{B656990D-21FA-4A3E-AE81-1FE9C4C08850}" type="datetimeFigureOut">
               <a:rPr lang="en-US" smtClean="0"/>
-              <a:t>10/30/2016</a:t>
+              <a:pPr/>
+              <a:t>11/1/2016</a:t>
             </a:fld>
             <a:endParaRPr lang="en-GB"/>
           </a:p>
@@ -2499,6 +2520,7 @@
           <a:p>
             <a:fld id="{FFB1C5F7-7D52-4F8D-A799-8E91F6DCDDE9}" type="slidenum">
               <a:rPr lang="en-GB" smtClean="0"/>
+              <a:pPr/>
               <a:t>‹#›</a:t>
             </a:fld>
             <a:endParaRPr lang="en-GB"/>
@@ -2665,7 +2687,8 @@
           <a:p>
             <a:fld id="{B656990D-21FA-4A3E-AE81-1FE9C4C08850}" type="datetimeFigureOut">
               <a:rPr lang="en-US" smtClean="0"/>
-              <a:t>10/30/2016</a:t>
+              <a:pPr/>
+              <a:t>11/1/2016</a:t>
             </a:fld>
             <a:endParaRPr lang="en-GB"/>
           </a:p>
@@ -2743,6 +2766,7 @@
           <a:p>
             <a:fld id="{FFB1C5F7-7D52-4F8D-A799-8E91F6DCDDE9}" type="slidenum">
               <a:rPr lang="en-GB" smtClean="0"/>
+              <a:pPr/>
               <a:t>‹#›</a:t>
             </a:fld>
             <a:endParaRPr lang="en-GB"/>
@@ -3089,7 +3113,7 @@
         </p:nvSpPr>
         <p:spPr>
           <a:xfrm>
-            <a:off x="4071934" y="4357694"/>
+            <a:off x="4071934" y="1785926"/>
             <a:ext cx="2714644" cy="1785950"/>
           </a:xfrm>
           <a:prstGeom prst="rect">
@@ -3249,7 +3273,7 @@
         </p:nvGrpSpPr>
         <p:grpSpPr>
           <a:xfrm>
-            <a:off x="357158" y="5609412"/>
+            <a:off x="357158" y="3037644"/>
             <a:ext cx="2500330" cy="677108"/>
             <a:chOff x="357158" y="5376462"/>
             <a:chExt cx="2500330" cy="677108"/>
@@ -3378,7 +3402,7 @@
         </p:nvGrpSpPr>
         <p:grpSpPr>
           <a:xfrm>
-            <a:off x="4143372" y="5286388"/>
+            <a:off x="4143372" y="2714620"/>
             <a:ext cx="2500330" cy="677108"/>
             <a:chOff x="357158" y="5376462"/>
             <a:chExt cx="2500330" cy="677108"/>
@@ -3507,7 +3531,7 @@
         </p:nvGrpSpPr>
         <p:grpSpPr>
           <a:xfrm>
-            <a:off x="4143372" y="4500570"/>
+            <a:off x="4143372" y="1928802"/>
             <a:ext cx="2500330" cy="677108"/>
             <a:chOff x="357158" y="5376462"/>
             <a:chExt cx="2500330" cy="677108"/>
@@ -3636,7 +3660,7 @@
         </p:nvGrpSpPr>
         <p:grpSpPr>
           <a:xfrm>
-            <a:off x="357158" y="4786322"/>
+            <a:off x="357158" y="2214554"/>
             <a:ext cx="2500330" cy="677108"/>
             <a:chOff x="357158" y="5376462"/>
             <a:chExt cx="2500330" cy="677108"/>
@@ -3761,14 +3785,13 @@
         <p:nvCxnSpPr>
           <p:cNvPr id="30" name="Curved Connector 29"/>
           <p:cNvCxnSpPr>
-            <a:stCxn id="14" idx="3"/>
             <a:endCxn id="24" idx="1"/>
           </p:cNvCxnSpPr>
           <p:nvPr/>
         </p:nvCxnSpPr>
         <p:spPr>
           <a:xfrm flipV="1">
-            <a:off x="2857488" y="5250669"/>
+            <a:off x="2857488" y="2678901"/>
             <a:ext cx="1214446" cy="866574"/>
           </a:xfrm>
           <a:prstGeom prst="curvedConnector3">
@@ -3789,491 +3812,6 @@
           </a:fillRef>
           <a:effectRef idx="1">
             <a:schemeClr val="dk1"/>
-          </a:effectRef>
-          <a:fontRef idx="minor">
-            <a:schemeClr val="tx1"/>
-          </a:fontRef>
-        </p:style>
-      </p:cxnSp>
-      <p:sp>
-        <p:nvSpPr>
-          <p:cNvPr id="31" name="Rectangle 30"/>
-          <p:cNvSpPr/>
-          <p:nvPr/>
-        </p:nvSpPr>
-        <p:spPr>
-          <a:xfrm>
-            <a:off x="214282" y="4500570"/>
-            <a:ext cx="2786082" cy="142876"/>
-          </a:xfrm>
-          <a:prstGeom prst="rect">
-            <a:avLst/>
-          </a:prstGeom>
-          <a:solidFill>
-            <a:schemeClr val="accent1">
-              <a:lumMod val="50000"/>
-            </a:schemeClr>
-          </a:solidFill>
-        </p:spPr>
-        <p:style>
-          <a:lnRef idx="2">
-            <a:schemeClr val="accent1">
-              <a:shade val="50000"/>
-            </a:schemeClr>
-          </a:lnRef>
-          <a:fillRef idx="1">
-            <a:schemeClr val="accent1"/>
-          </a:fillRef>
-          <a:effectRef idx="0">
-            <a:schemeClr val="accent1"/>
-          </a:effectRef>
-          <a:fontRef idx="minor">
-            <a:schemeClr val="lt1"/>
-          </a:fontRef>
-        </p:style>
-        <p:txBody>
-          <a:bodyPr rtlCol="0" anchor="ctr"/>
-          <a:lstStyle/>
-          <a:p>
-            <a:pPr algn="ctr"/>
-            <a:endParaRPr lang="en-GB"/>
-          </a:p>
-        </p:txBody>
-      </p:sp>
-      <p:grpSp>
-        <p:nvGrpSpPr>
-          <p:cNvPr id="33" name="Group 32"/>
-          <p:cNvGrpSpPr/>
-          <p:nvPr/>
-        </p:nvGrpSpPr>
-        <p:grpSpPr>
-          <a:xfrm>
-            <a:off x="357158" y="3609148"/>
-            <a:ext cx="2500330" cy="677108"/>
-            <a:chOff x="357158" y="5376462"/>
-            <a:chExt cx="2500330" cy="677108"/>
-          </a:xfrm>
-        </p:grpSpPr>
-        <p:sp>
-          <p:nvSpPr>
-            <p:cNvPr id="34" name="TextBox 33"/>
-            <p:cNvSpPr txBox="1"/>
-            <p:nvPr/>
-          </p:nvSpPr>
-          <p:spPr>
-            <a:xfrm>
-              <a:off x="357158" y="5376462"/>
-              <a:ext cx="1071570" cy="338554"/>
-            </a:xfrm>
-            <a:prstGeom prst="rect">
-              <a:avLst/>
-            </a:prstGeom>
-            <a:solidFill>
-              <a:schemeClr val="accent1"/>
-            </a:solidFill>
-            <a:ln>
-              <a:solidFill>
-                <a:schemeClr val="tx2"/>
-              </a:solidFill>
-            </a:ln>
-          </p:spPr>
-          <p:txBody>
-            <a:bodyPr wrap="square" rtlCol="0">
-              <a:spAutoFit/>
-            </a:bodyPr>
-            <a:lstStyle/>
-            <a:p>
-              <a:pPr algn="ctr"/>
-              <a:r>
-                <a:rPr lang="en-GB" sz="1600" dirty="0" smtClean="0"/>
-                <a:t>Point</a:t>
-              </a:r>
-              <a:endParaRPr lang="en-GB" sz="1600" dirty="0"/>
-            </a:p>
-          </p:txBody>
-        </p:sp>
-        <p:sp>
-          <p:nvSpPr>
-            <p:cNvPr id="35" name="TextBox 34"/>
-            <p:cNvSpPr txBox="1"/>
-            <p:nvPr/>
-          </p:nvSpPr>
-          <p:spPr>
-            <a:xfrm>
-              <a:off x="1785918" y="5376462"/>
-              <a:ext cx="1071570" cy="338554"/>
-            </a:xfrm>
-            <a:prstGeom prst="rect">
-              <a:avLst/>
-            </a:prstGeom>
-            <a:solidFill>
-              <a:schemeClr val="accent1"/>
-            </a:solidFill>
-            <a:ln>
-              <a:solidFill>
-                <a:schemeClr val="tx2"/>
-              </a:solidFill>
-            </a:ln>
-          </p:spPr>
-          <p:txBody>
-            <a:bodyPr wrap="square" rtlCol="0">
-              <a:spAutoFit/>
-            </a:bodyPr>
-            <a:lstStyle/>
-            <a:p>
-              <a:pPr algn="ctr"/>
-              <a:r>
-                <a:rPr lang="en-GB" sz="1600" dirty="0" smtClean="0"/>
-                <a:t>point</a:t>
-              </a:r>
-              <a:endParaRPr lang="en-GB" sz="1600" dirty="0"/>
-            </a:p>
-          </p:txBody>
-        </p:sp>
-        <p:sp>
-          <p:nvSpPr>
-            <p:cNvPr id="36" name="TextBox 35"/>
-            <p:cNvSpPr txBox="1"/>
-            <p:nvPr/>
-          </p:nvSpPr>
-          <p:spPr>
-            <a:xfrm>
-              <a:off x="357158" y="5715016"/>
-              <a:ext cx="2500330" cy="338554"/>
-            </a:xfrm>
-            <a:prstGeom prst="rect">
-              <a:avLst/>
-            </a:prstGeom>
-            <a:solidFill>
-              <a:schemeClr val="accent1"/>
-            </a:solidFill>
-            <a:ln>
-              <a:solidFill>
-                <a:schemeClr val="tx2"/>
-              </a:solidFill>
-            </a:ln>
-          </p:spPr>
-          <p:txBody>
-            <a:bodyPr wrap="square" rtlCol="0">
-              <a:spAutoFit/>
-            </a:bodyPr>
-            <a:lstStyle/>
-            <a:p>
-              <a:pPr algn="ctr"/>
-              <a:r>
-                <a:rPr lang="en-GB" sz="1600" dirty="0" smtClean="0"/>
-                <a:t>null</a:t>
-              </a:r>
-              <a:endParaRPr lang="en-GB" sz="1600" dirty="0"/>
-            </a:p>
-          </p:txBody>
-        </p:sp>
-      </p:grpSp>
-      <p:grpSp>
-        <p:nvGrpSpPr>
-          <p:cNvPr id="37" name="Group 36"/>
-          <p:cNvGrpSpPr/>
-          <p:nvPr/>
-        </p:nvGrpSpPr>
-        <p:grpSpPr>
-          <a:xfrm>
-            <a:off x="357158" y="2786058"/>
-            <a:ext cx="2500330" cy="677108"/>
-            <a:chOff x="357158" y="5376462"/>
-            <a:chExt cx="2500330" cy="677108"/>
-          </a:xfrm>
-        </p:grpSpPr>
-        <p:sp>
-          <p:nvSpPr>
-            <p:cNvPr id="38" name="TextBox 37"/>
-            <p:cNvSpPr txBox="1"/>
-            <p:nvPr/>
-          </p:nvSpPr>
-          <p:spPr>
-            <a:xfrm>
-              <a:off x="357158" y="5376462"/>
-              <a:ext cx="1071570" cy="338554"/>
-            </a:xfrm>
-            <a:prstGeom prst="rect">
-              <a:avLst/>
-            </a:prstGeom>
-            <a:solidFill>
-              <a:schemeClr val="accent1"/>
-            </a:solidFill>
-            <a:ln>
-              <a:solidFill>
-                <a:schemeClr val="tx2"/>
-              </a:solidFill>
-            </a:ln>
-          </p:spPr>
-          <p:txBody>
-            <a:bodyPr wrap="square" rtlCol="0">
-              <a:spAutoFit/>
-            </a:bodyPr>
-            <a:lstStyle/>
-            <a:p>
-              <a:pPr algn="ctr"/>
-              <a:r>
-                <a:rPr lang="en-GB" sz="1600" dirty="0" smtClean="0"/>
-                <a:t>int</a:t>
-              </a:r>
-              <a:endParaRPr lang="en-GB" sz="1600" dirty="0"/>
-            </a:p>
-          </p:txBody>
-        </p:sp>
-        <p:sp>
-          <p:nvSpPr>
-            <p:cNvPr id="39" name="TextBox 38"/>
-            <p:cNvSpPr txBox="1"/>
-            <p:nvPr/>
-          </p:nvSpPr>
-          <p:spPr>
-            <a:xfrm>
-              <a:off x="1785918" y="5376462"/>
-              <a:ext cx="1071570" cy="338554"/>
-            </a:xfrm>
-            <a:prstGeom prst="rect">
-              <a:avLst/>
-            </a:prstGeom>
-            <a:solidFill>
-              <a:schemeClr val="accent1"/>
-            </a:solidFill>
-            <a:ln>
-              <a:solidFill>
-                <a:schemeClr val="tx2"/>
-              </a:solidFill>
-            </a:ln>
-          </p:spPr>
-          <p:txBody>
-            <a:bodyPr wrap="square" rtlCol="0">
-              <a:spAutoFit/>
-            </a:bodyPr>
-            <a:lstStyle/>
-            <a:p>
-              <a:pPr algn="ctr"/>
-              <a:r>
-                <a:rPr lang="en-GB" sz="1600" dirty="0" smtClean="0"/>
-                <a:t>n</a:t>
-              </a:r>
-              <a:endParaRPr lang="en-GB" sz="1600" dirty="0"/>
-            </a:p>
-          </p:txBody>
-        </p:sp>
-        <p:sp>
-          <p:nvSpPr>
-            <p:cNvPr id="40" name="TextBox 39"/>
-            <p:cNvSpPr txBox="1"/>
-            <p:nvPr/>
-          </p:nvSpPr>
-          <p:spPr>
-            <a:xfrm>
-              <a:off x="357158" y="5715016"/>
-              <a:ext cx="2500330" cy="338554"/>
-            </a:xfrm>
-            <a:prstGeom prst="rect">
-              <a:avLst/>
-            </a:prstGeom>
-            <a:solidFill>
-              <a:schemeClr val="accent1"/>
-            </a:solidFill>
-            <a:ln>
-              <a:solidFill>
-                <a:schemeClr val="tx2"/>
-              </a:solidFill>
-            </a:ln>
-          </p:spPr>
-          <p:txBody>
-            <a:bodyPr wrap="square" rtlCol="0">
-              <a:spAutoFit/>
-            </a:bodyPr>
-            <a:lstStyle/>
-            <a:p>
-              <a:pPr algn="ctr"/>
-              <a:r>
-                <a:rPr lang="en-GB" sz="1600" dirty="0" smtClean="0"/>
-                <a:t>1</a:t>
-              </a:r>
-              <a:endParaRPr lang="en-GB" sz="1600" dirty="0"/>
-            </a:p>
-          </p:txBody>
-        </p:sp>
-      </p:grpSp>
-      <p:cxnSp>
-        <p:nvCxnSpPr>
-          <p:cNvPr id="41" name="Curved Connector 40"/>
-          <p:cNvCxnSpPr>
-            <a:stCxn id="36" idx="3"/>
-            <a:endCxn id="24" idx="1"/>
-          </p:cNvCxnSpPr>
-          <p:nvPr/>
-        </p:nvCxnSpPr>
-        <p:spPr>
-          <a:xfrm>
-            <a:off x="2857488" y="4116979"/>
-            <a:ext cx="1214446" cy="1133690"/>
-          </a:xfrm>
-          <a:prstGeom prst="curvedConnector3">
-            <a:avLst>
-              <a:gd name="adj1" fmla="val 50000"/>
-            </a:avLst>
-          </a:prstGeom>
-          <a:ln>
-            <a:tailEnd type="arrow"/>
-          </a:ln>
-        </p:spPr>
-        <p:style>
-          <a:lnRef idx="2">
-            <a:schemeClr val="dk1"/>
-          </a:lnRef>
-          <a:fillRef idx="0">
-            <a:schemeClr val="dk1"/>
-          </a:fillRef>
-          <a:effectRef idx="1">
-            <a:schemeClr val="dk1"/>
-          </a:effectRef>
-          <a:fontRef idx="minor">
-            <a:schemeClr val="tx1"/>
-          </a:fontRef>
-        </p:style>
-      </p:cxnSp>
-      <p:cxnSp>
-        <p:nvCxnSpPr>
-          <p:cNvPr id="45" name="Straight Connector 44"/>
-          <p:cNvCxnSpPr/>
-          <p:nvPr/>
-        </p:nvCxnSpPr>
-        <p:spPr>
-          <a:xfrm rot="10800000" flipV="1">
-            <a:off x="3214678" y="4357694"/>
-            <a:ext cx="500066" cy="357190"/>
-          </a:xfrm>
-          <a:prstGeom prst="line">
-            <a:avLst/>
-          </a:prstGeom>
-          <a:ln w="57150">
-            <a:solidFill>
-              <a:srgbClr val="FF0000"/>
-            </a:solidFill>
-          </a:ln>
-        </p:spPr>
-        <p:style>
-          <a:lnRef idx="1">
-            <a:schemeClr val="accent1"/>
-          </a:lnRef>
-          <a:fillRef idx="0">
-            <a:schemeClr val="accent1"/>
-          </a:fillRef>
-          <a:effectRef idx="0">
-            <a:schemeClr val="accent1"/>
-          </a:effectRef>
-          <a:fontRef idx="minor">
-            <a:schemeClr val="tx1"/>
-          </a:fontRef>
-        </p:style>
-      </p:cxnSp>
-      <p:cxnSp>
-        <p:nvCxnSpPr>
-          <p:cNvPr id="46" name="Straight Connector 45"/>
-          <p:cNvCxnSpPr/>
-          <p:nvPr/>
-        </p:nvCxnSpPr>
-        <p:spPr>
-          <a:xfrm rot="16200000" flipH="1">
-            <a:off x="3250397" y="4321975"/>
-            <a:ext cx="438152" cy="366714"/>
-          </a:xfrm>
-          <a:prstGeom prst="line">
-            <a:avLst/>
-          </a:prstGeom>
-          <a:ln w="57150">
-            <a:solidFill>
-              <a:srgbClr val="FF0000"/>
-            </a:solidFill>
-          </a:ln>
-        </p:spPr>
-        <p:style>
-          <a:lnRef idx="1">
-            <a:schemeClr val="accent1"/>
-          </a:lnRef>
-          <a:fillRef idx="0">
-            <a:schemeClr val="accent1"/>
-          </a:fillRef>
-          <a:effectRef idx="0">
-            <a:schemeClr val="accent1"/>
-          </a:effectRef>
-          <a:fontRef idx="minor">
-            <a:schemeClr val="tx1"/>
-          </a:fontRef>
-        </p:style>
-      </p:cxnSp>
-      <p:cxnSp>
-        <p:nvCxnSpPr>
-          <p:cNvPr id="49" name="Straight Connector 48"/>
-          <p:cNvCxnSpPr>
-            <a:endCxn id="31" idx="3"/>
-          </p:cNvCxnSpPr>
-          <p:nvPr/>
-        </p:nvCxnSpPr>
-        <p:spPr>
-          <a:xfrm>
-            <a:off x="285720" y="2571744"/>
-            <a:ext cx="2714644" cy="2000264"/>
-          </a:xfrm>
-          <a:prstGeom prst="line">
-            <a:avLst/>
-          </a:prstGeom>
-          <a:ln w="57150">
-            <a:solidFill>
-              <a:srgbClr val="FF0000"/>
-            </a:solidFill>
-          </a:ln>
-        </p:spPr>
-        <p:style>
-          <a:lnRef idx="1">
-            <a:schemeClr val="accent1"/>
-          </a:lnRef>
-          <a:fillRef idx="0">
-            <a:schemeClr val="accent1"/>
-          </a:fillRef>
-          <a:effectRef idx="0">
-            <a:schemeClr val="accent1"/>
-          </a:effectRef>
-          <a:fontRef idx="minor">
-            <a:schemeClr val="tx1"/>
-          </a:fontRef>
-        </p:style>
-      </p:cxnSp>
-      <p:cxnSp>
-        <p:nvCxnSpPr>
-          <p:cNvPr id="51" name="Straight Connector 50"/>
-          <p:cNvCxnSpPr>
-            <a:endCxn id="31" idx="1"/>
-          </p:cNvCxnSpPr>
-          <p:nvPr/>
-        </p:nvCxnSpPr>
-        <p:spPr>
-          <a:xfrm rot="10800000" flipV="1">
-            <a:off x="214282" y="2571744"/>
-            <a:ext cx="2714644" cy="2000264"/>
-          </a:xfrm>
-          <a:prstGeom prst="line">
-            <a:avLst/>
-          </a:prstGeom>
-          <a:ln w="57150">
-            <a:solidFill>
-              <a:srgbClr val="FF0000"/>
-            </a:solidFill>
-          </a:ln>
-        </p:spPr>
-        <p:style>
-          <a:lnRef idx="1">
-            <a:schemeClr val="accent1"/>
-          </a:lnRef>
-          <a:fillRef idx="0">
-            <a:schemeClr val="accent1"/>
-          </a:fillRef>
-          <a:effectRef idx="0">
-            <a:schemeClr val="accent1"/>
           </a:effectRef>
           <a:fontRef idx="minor">
             <a:schemeClr val="tx1"/>

</xml_diff>